<commit_message>
Update for DDP assets
</commit_message>
<xml_diff>
--- a/High School/Design and Drawing for Production/Unit 2 - Title Block/Section 2 - Architect Scale/Assets/Unit 2 - Section 2 - Architect Scale.pptx
+++ b/High School/Design and Drawing for Production/Unit 2 - Title Block/Section 2 - Architect Scale/Assets/Unit 2 - Section 2 - Architect Scale.pptx
@@ -5,20 +5,22 @@
     <p:sldMasterId id="2147483648" r:id="rId1"/>
   </p:sldMasterIdLst>
   <p:notesMasterIdLst>
-    <p:notesMasterId r:id="rId10"/>
+    <p:notesMasterId r:id="rId12"/>
   </p:notesMasterIdLst>
   <p:handoutMasterIdLst>
-    <p:handoutMasterId r:id="rId11"/>
+    <p:handoutMasterId r:id="rId13"/>
   </p:handoutMasterIdLst>
   <p:sldIdLst>
     <p:sldId id="268" r:id="rId2"/>
-    <p:sldId id="271" r:id="rId3"/>
-    <p:sldId id="272" r:id="rId4"/>
-    <p:sldId id="273" r:id="rId5"/>
-    <p:sldId id="274" r:id="rId6"/>
-    <p:sldId id="275" r:id="rId7"/>
-    <p:sldId id="276" r:id="rId8"/>
-    <p:sldId id="277" r:id="rId9"/>
+    <p:sldId id="278" r:id="rId3"/>
+    <p:sldId id="271" r:id="rId4"/>
+    <p:sldId id="272" r:id="rId5"/>
+    <p:sldId id="279" r:id="rId6"/>
+    <p:sldId id="273" r:id="rId7"/>
+    <p:sldId id="274" r:id="rId8"/>
+    <p:sldId id="275" r:id="rId9"/>
+    <p:sldId id="276" r:id="rId10"/>
+    <p:sldId id="277" r:id="rId11"/>
   </p:sldIdLst>
   <p:sldSz cx="12192000" cy="6858000"/>
   <p:notesSz cx="6858000" cy="9144000"/>
@@ -3865,39 +3867,6 @@
       </p:sp>
       <p:sp>
         <p:nvSpPr>
-          <p:cNvPr id="3" name="Subtitle 2"/>
-          <p:cNvSpPr>
-            <a:spLocks noGrp="1"/>
-          </p:cNvSpPr>
-          <p:nvPr>
-            <p:ph type="subTitle" idx="1"/>
-          </p:nvPr>
-        </p:nvSpPr>
-        <p:spPr/>
-        <p:txBody>
-          <a:bodyPr>
-            <a:normAutofit fontScale="92500" lnSpcReduction="10000"/>
-          </a:bodyPr>
-          <a:lstStyle/>
-          <a:p>
-            <a:r>
-              <a:rPr lang="en-US" dirty="0"/>
-              <a:t>Unit 2 – Title Block </a:t>
-            </a:r>
-          </a:p>
-          <a:p>
-            <a:endParaRPr lang="en-US" dirty="0"/>
-          </a:p>
-          <a:p>
-            <a:r>
-              <a:rPr lang="en-US" dirty="0"/>
-              <a:t>Section 2 – Architect Scale</a:t>
-            </a:r>
-          </a:p>
-        </p:txBody>
-      </p:sp>
-      <p:sp>
-        <p:nvSpPr>
           <p:cNvPr id="4" name="Footer Placeholder 3">
             <a:extLst>
               <a:ext uri="{FF2B5EF4-FFF2-40B4-BE49-F238E27FC236}">
@@ -3928,6 +3897,155 @@
     <p:extLst>
       <p:ext uri="{BB962C8B-B14F-4D97-AF65-F5344CB8AC3E}">
         <p14:creationId xmlns:p14="http://schemas.microsoft.com/office/powerpoint/2010/main" val="2413251912"/>
+      </p:ext>
+    </p:extLst>
+  </p:cSld>
+  <p:clrMapOvr>
+    <a:masterClrMapping/>
+  </p:clrMapOvr>
+  <mc:AlternateContent xmlns:mc="http://schemas.openxmlformats.org/markup-compatibility/2006" xmlns:p14="http://schemas.microsoft.com/office/powerpoint/2010/main">
+    <mc:Choice Requires="p14">
+      <p:transition spd="med" p14:dur="700">
+        <p:fade/>
+      </p:transition>
+    </mc:Choice>
+    <mc:Fallback xmlns="">
+      <p:transition spd="med">
+        <p:fade/>
+      </p:transition>
+    </mc:Fallback>
+  </mc:AlternateContent>
+</p:sld>
+</file>
+
+<file path=ppt/slides/slide10.xml><?xml version="1.0" encoding="utf-8"?>
+<p:sld xmlns:a="http://schemas.openxmlformats.org/drawingml/2006/main" xmlns:r="http://schemas.openxmlformats.org/officeDocument/2006/relationships" xmlns:p="http://schemas.openxmlformats.org/presentationml/2006/main">
+  <p:cSld>
+    <p:spTree>
+      <p:nvGrpSpPr>
+        <p:cNvPr id="1" name=""/>
+        <p:cNvGrpSpPr/>
+        <p:nvPr/>
+      </p:nvGrpSpPr>
+      <p:grpSpPr>
+        <a:xfrm>
+          <a:off x="0" y="0"/>
+          <a:ext cx="0" cy="0"/>
+          <a:chOff x="0" y="0"/>
+          <a:chExt cx="0" cy="0"/>
+        </a:xfrm>
+      </p:grpSpPr>
+      <p:sp>
+        <p:nvSpPr>
+          <p:cNvPr id="2" name="Title 1">
+            <a:extLst>
+              <a:ext uri="{FF2B5EF4-FFF2-40B4-BE49-F238E27FC236}">
+                <a16:creationId xmlns:a16="http://schemas.microsoft.com/office/drawing/2014/main" id="{A4C971C0-D93B-45D8-BA8B-A9D98C51B706}"/>
+              </a:ext>
+            </a:extLst>
+          </p:cNvPr>
+          <p:cNvSpPr>
+            <a:spLocks noGrp="1"/>
+          </p:cNvSpPr>
+          <p:nvPr>
+            <p:ph type="title"/>
+          </p:nvPr>
+        </p:nvSpPr>
+        <p:spPr/>
+        <p:txBody>
+          <a:bodyPr/>
+          <a:lstStyle/>
+          <a:p>
+            <a:r>
+              <a:rPr lang="en-US" dirty="0"/>
+              <a:t>Drawn to scale?</a:t>
+            </a:r>
+          </a:p>
+        </p:txBody>
+      </p:sp>
+      <p:sp>
+        <p:nvSpPr>
+          <p:cNvPr id="4" name="Footer Placeholder 3">
+            <a:extLst>
+              <a:ext uri="{FF2B5EF4-FFF2-40B4-BE49-F238E27FC236}">
+                <a16:creationId xmlns:a16="http://schemas.microsoft.com/office/drawing/2014/main" id="{F7804C1A-E949-45EB-B41C-0FBCA44D8F99}"/>
+              </a:ext>
+            </a:extLst>
+          </p:cNvPr>
+          <p:cNvSpPr>
+            <a:spLocks noGrp="1"/>
+          </p:cNvSpPr>
+          <p:nvPr>
+            <p:ph type="ftr" sz="quarter" idx="11"/>
+          </p:nvPr>
+        </p:nvSpPr>
+        <p:spPr/>
+        <p:txBody>
+          <a:bodyPr/>
+          <a:lstStyle/>
+          <a:p>
+            <a:r>
+              <a:rPr lang="en-US"/>
+              <a:t>Add a footer</a:t>
+            </a:r>
+            <a:endParaRPr lang="en-US" dirty="0"/>
+          </a:p>
+        </p:txBody>
+      </p:sp>
+      <p:sp>
+        <p:nvSpPr>
+          <p:cNvPr id="7" name="Content Placeholder 6">
+            <a:extLst>
+              <a:ext uri="{FF2B5EF4-FFF2-40B4-BE49-F238E27FC236}">
+                <a16:creationId xmlns:a16="http://schemas.microsoft.com/office/drawing/2014/main" id="{39B63222-2E6C-4372-B810-03E263DE588E}"/>
+              </a:ext>
+            </a:extLst>
+          </p:cNvPr>
+          <p:cNvSpPr>
+            <a:spLocks noGrp="1"/>
+          </p:cNvSpPr>
+          <p:nvPr>
+            <p:ph idx="1"/>
+          </p:nvPr>
+        </p:nvSpPr>
+        <p:spPr/>
+        <p:txBody>
+          <a:bodyPr>
+            <a:normAutofit/>
+          </a:bodyPr>
+          <a:lstStyle/>
+          <a:p>
+            <a:pPr marL="457200" indent="-457200">
+              <a:spcBef>
+                <a:spcPct val="50000"/>
+              </a:spcBef>
+              <a:buFont typeface="Arial" pitchFamily="34" charset="0"/>
+              <a:buChar char="•"/>
+            </a:pPr>
+            <a:r>
+              <a:rPr lang="en-US" sz="4000" dirty="0"/>
+              <a:t>Floor plans for residential structures are usually drawn at ¼” = 1’.</a:t>
+            </a:r>
+          </a:p>
+          <a:p>
+            <a:pPr marL="457200" indent="-457200">
+              <a:spcBef>
+                <a:spcPct val="50000"/>
+              </a:spcBef>
+              <a:buFont typeface="Arial" pitchFamily="34" charset="0"/>
+              <a:buChar char="•"/>
+            </a:pPr>
+            <a:r>
+              <a:rPr lang="en-US" sz="4000" dirty="0"/>
+              <a:t>Commercial buildings may be drawn at 1/8” = 1’ if they are too large to fit on the desired sheet size at ¼” = 1’.</a:t>
+            </a:r>
+          </a:p>
+        </p:txBody>
+      </p:sp>
+    </p:spTree>
+    <p:extLst>
+      <p:ext uri="{BB962C8B-B14F-4D97-AF65-F5344CB8AC3E}">
+        <p14:creationId xmlns:p14="http://schemas.microsoft.com/office/powerpoint/2010/main" val="3350062661"/>
       </p:ext>
     </p:extLst>
   </p:cSld>
@@ -3968,80 +4086,10 @@
       </p:grpSpPr>
       <p:sp>
         <p:nvSpPr>
-          <p:cNvPr id="2" name="Title 1"/>
-          <p:cNvSpPr>
-            <a:spLocks noGrp="1"/>
-          </p:cNvSpPr>
-          <p:nvPr>
-            <p:ph type="title"/>
-          </p:nvPr>
-        </p:nvSpPr>
-        <p:spPr/>
-        <p:txBody>
-          <a:bodyPr/>
-          <a:lstStyle/>
-          <a:p>
-            <a:r>
-              <a:rPr lang="en-US" dirty="0"/>
-              <a:t>The big idea</a:t>
-            </a:r>
-          </a:p>
-        </p:txBody>
-      </p:sp>
-      <p:sp>
-        <p:nvSpPr>
-          <p:cNvPr id="3" name="Content Placeholder 2"/>
-          <p:cNvSpPr>
-            <a:spLocks noGrp="1"/>
-          </p:cNvSpPr>
-          <p:nvPr>
-            <p:ph idx="1"/>
-          </p:nvPr>
-        </p:nvSpPr>
-        <p:spPr/>
-        <p:txBody>
-          <a:bodyPr/>
-          <a:lstStyle/>
-          <a:p>
-            <a:r>
-              <a:rPr lang="en-US" dirty="0">
-                <a:cs typeface="Arial" pitchFamily="34" charset="0"/>
-              </a:rPr>
-              <a:t>Understand the importance of architect scale usage</a:t>
-            </a:r>
-          </a:p>
-          <a:p>
-            <a:r>
-              <a:rPr lang="en-US" dirty="0">
-                <a:cs typeface="Arial" pitchFamily="34" charset="0"/>
-              </a:rPr>
-              <a:t>Be sure to always identify the scale used</a:t>
-            </a:r>
-          </a:p>
-          <a:p>
-            <a:r>
-              <a:rPr lang="en-US" dirty="0">
-                <a:cs typeface="Arial" pitchFamily="34" charset="0"/>
-              </a:rPr>
-              <a:t>Adding the used scale to our Title Blocks</a:t>
-            </a:r>
-          </a:p>
-          <a:p>
-            <a:r>
-              <a:rPr lang="en-US" dirty="0">
-                <a:cs typeface="Arial" pitchFamily="34" charset="0"/>
-              </a:rPr>
-              <a:t>Using various scales</a:t>
-            </a:r>
-          </a:p>
-        </p:txBody>
-      </p:sp>
-      <p:sp>
-        <p:nvSpPr>
-          <p:cNvPr id="4" name="Footer Placeholder 3">
+          <p:cNvPr id="2" name="Title 1">
             <a:extLst>
               <a:ext uri="{FF2B5EF4-FFF2-40B4-BE49-F238E27FC236}">
-                <a16:creationId xmlns:a16="http://schemas.microsoft.com/office/drawing/2014/main" id="{EADFB87E-2A3F-4815-8F5E-3CF3521EBF24}"/>
+                <a16:creationId xmlns:a16="http://schemas.microsoft.com/office/drawing/2014/main" id="{C94531F4-808A-4D01-86BF-A4A827F93B3E}"/>
               </a:ext>
             </a:extLst>
           </p:cNvPr>
@@ -4049,7 +4097,40 @@
             <a:spLocks noGrp="1"/>
           </p:cNvSpPr>
           <p:nvPr>
-            <p:ph type="ftr" sz="quarter" idx="11"/>
+            <p:ph type="title"/>
+          </p:nvPr>
+        </p:nvSpPr>
+        <p:spPr>
+          <a:xfrm>
+            <a:off x="609600" y="822960"/>
+            <a:ext cx="8686800" cy="2011680"/>
+          </a:xfrm>
+        </p:spPr>
+        <p:txBody>
+          <a:bodyPr/>
+          <a:lstStyle/>
+          <a:p>
+            <a:r>
+              <a:rPr lang="en-US" dirty="0"/>
+              <a:t>Unit 2 – The title block</a:t>
+            </a:r>
+          </a:p>
+        </p:txBody>
+      </p:sp>
+      <p:sp>
+        <p:nvSpPr>
+          <p:cNvPr id="3" name="Text Placeholder 2">
+            <a:extLst>
+              <a:ext uri="{FF2B5EF4-FFF2-40B4-BE49-F238E27FC236}">
+                <a16:creationId xmlns:a16="http://schemas.microsoft.com/office/drawing/2014/main" id="{CA4FB17A-6A7B-4880-8845-8B58260F40DE}"/>
+              </a:ext>
+            </a:extLst>
+          </p:cNvPr>
+          <p:cNvSpPr>
+            <a:spLocks noGrp="1"/>
+          </p:cNvSpPr>
+          <p:nvPr>
+            <p:ph type="body" idx="1"/>
           </p:nvPr>
         </p:nvSpPr>
         <p:spPr/>
@@ -4059,7 +4140,7 @@
           <a:p>
             <a:r>
               <a:rPr lang="en-US" dirty="0"/>
-              <a:t>Unit 1 – Section 1 - Day 1</a:t>
+              <a:t>Section 2 – Architect Scale</a:t>
             </a:r>
           </a:p>
         </p:txBody>
@@ -4067,7 +4148,7 @@
     </p:spTree>
     <p:extLst>
       <p:ext uri="{BB962C8B-B14F-4D97-AF65-F5344CB8AC3E}">
-        <p14:creationId xmlns:p14="http://schemas.microsoft.com/office/powerpoint/2010/main" val="78530218"/>
+        <p14:creationId xmlns:p14="http://schemas.microsoft.com/office/powerpoint/2010/main" val="3690899428"/>
       </p:ext>
     </p:extLst>
   </p:cSld>
@@ -4123,6 +4204,146 @@
           <a:p>
             <a:r>
               <a:rPr lang="en-US" dirty="0"/>
+              <a:t>The big idea</a:t>
+            </a:r>
+          </a:p>
+        </p:txBody>
+      </p:sp>
+      <p:sp>
+        <p:nvSpPr>
+          <p:cNvPr id="3" name="Content Placeholder 2"/>
+          <p:cNvSpPr>
+            <a:spLocks noGrp="1"/>
+          </p:cNvSpPr>
+          <p:nvPr>
+            <p:ph idx="1"/>
+          </p:nvPr>
+        </p:nvSpPr>
+        <p:spPr/>
+        <p:txBody>
+          <a:bodyPr/>
+          <a:lstStyle/>
+          <a:p>
+            <a:r>
+              <a:rPr lang="en-US" dirty="0">
+                <a:cs typeface="Arial" pitchFamily="34" charset="0"/>
+              </a:rPr>
+              <a:t>Understand the importance of architect scale usage</a:t>
+            </a:r>
+          </a:p>
+          <a:p>
+            <a:r>
+              <a:rPr lang="en-US" dirty="0">
+                <a:cs typeface="Arial" pitchFamily="34" charset="0"/>
+              </a:rPr>
+              <a:t>Be sure to always identify the scale used</a:t>
+            </a:r>
+          </a:p>
+          <a:p>
+            <a:r>
+              <a:rPr lang="en-US" dirty="0">
+                <a:cs typeface="Arial" pitchFamily="34" charset="0"/>
+              </a:rPr>
+              <a:t>Adding the used scale to our Title Blocks</a:t>
+            </a:r>
+          </a:p>
+          <a:p>
+            <a:r>
+              <a:rPr lang="en-US" dirty="0">
+                <a:cs typeface="Arial" pitchFamily="34" charset="0"/>
+              </a:rPr>
+              <a:t>Using various scales</a:t>
+            </a:r>
+          </a:p>
+        </p:txBody>
+      </p:sp>
+      <p:sp>
+        <p:nvSpPr>
+          <p:cNvPr id="4" name="Footer Placeholder 3">
+            <a:extLst>
+              <a:ext uri="{FF2B5EF4-FFF2-40B4-BE49-F238E27FC236}">
+                <a16:creationId xmlns:a16="http://schemas.microsoft.com/office/drawing/2014/main" id="{EADFB87E-2A3F-4815-8F5E-3CF3521EBF24}"/>
+              </a:ext>
+            </a:extLst>
+          </p:cNvPr>
+          <p:cNvSpPr>
+            <a:spLocks noGrp="1"/>
+          </p:cNvSpPr>
+          <p:nvPr>
+            <p:ph type="ftr" sz="quarter" idx="11"/>
+          </p:nvPr>
+        </p:nvSpPr>
+        <p:spPr/>
+        <p:txBody>
+          <a:bodyPr/>
+          <a:lstStyle/>
+          <a:p>
+            <a:r>
+              <a:rPr lang="en-US" dirty="0"/>
+              <a:t>Unit 1 – Section 1 - Day 1</a:t>
+            </a:r>
+          </a:p>
+        </p:txBody>
+      </p:sp>
+    </p:spTree>
+    <p:extLst>
+      <p:ext uri="{BB962C8B-B14F-4D97-AF65-F5344CB8AC3E}">
+        <p14:creationId xmlns:p14="http://schemas.microsoft.com/office/powerpoint/2010/main" val="78530218"/>
+      </p:ext>
+    </p:extLst>
+  </p:cSld>
+  <p:clrMapOvr>
+    <a:masterClrMapping/>
+  </p:clrMapOvr>
+  <mc:AlternateContent xmlns:mc="http://schemas.openxmlformats.org/markup-compatibility/2006" xmlns:p14="http://schemas.microsoft.com/office/powerpoint/2010/main">
+    <mc:Choice Requires="p14">
+      <p:transition spd="med" p14:dur="700">
+        <p:fade/>
+      </p:transition>
+    </mc:Choice>
+    <mc:Fallback xmlns="">
+      <p:transition spd="med">
+        <p:fade/>
+      </p:transition>
+    </mc:Fallback>
+  </mc:AlternateContent>
+</p:sld>
+</file>
+
+<file path=ppt/slides/slide4.xml><?xml version="1.0" encoding="utf-8"?>
+<p:sld xmlns:a="http://schemas.openxmlformats.org/drawingml/2006/main" xmlns:r="http://schemas.openxmlformats.org/officeDocument/2006/relationships" xmlns:p="http://schemas.openxmlformats.org/presentationml/2006/main">
+  <p:cSld>
+    <p:spTree>
+      <p:nvGrpSpPr>
+        <p:cNvPr id="1" name=""/>
+        <p:cNvGrpSpPr/>
+        <p:nvPr/>
+      </p:nvGrpSpPr>
+      <p:grpSpPr>
+        <a:xfrm>
+          <a:off x="0" y="0"/>
+          <a:ext cx="0" cy="0"/>
+          <a:chOff x="0" y="0"/>
+          <a:chExt cx="0" cy="0"/>
+        </a:xfrm>
+      </p:grpSpPr>
+      <p:sp>
+        <p:nvSpPr>
+          <p:cNvPr id="2" name="Title 1"/>
+          <p:cNvSpPr>
+            <a:spLocks noGrp="1"/>
+          </p:cNvSpPr>
+          <p:nvPr>
+            <p:ph type="title"/>
+          </p:nvPr>
+        </p:nvSpPr>
+        <p:spPr/>
+        <p:txBody>
+          <a:bodyPr/>
+          <a:lstStyle/>
+          <a:p>
+            <a:r>
+              <a:rPr lang="en-US" dirty="0"/>
               <a:t>Google classroom code</a:t>
             </a:r>
           </a:p>
@@ -4211,7 +4432,157 @@
 </p:sld>
 </file>
 
-<file path=ppt/slides/slide4.xml><?xml version="1.0" encoding="utf-8"?>
+<file path=ppt/slides/slide5.xml><?xml version="1.0" encoding="utf-8"?>
+<p:sld xmlns:a="http://schemas.openxmlformats.org/drawingml/2006/main" xmlns:r="http://schemas.openxmlformats.org/officeDocument/2006/relationships" xmlns:p="http://schemas.openxmlformats.org/presentationml/2006/main">
+  <p:cSld>
+    <p:spTree>
+      <p:nvGrpSpPr>
+        <p:cNvPr id="1" name=""/>
+        <p:cNvGrpSpPr/>
+        <p:nvPr/>
+      </p:nvGrpSpPr>
+      <p:grpSpPr>
+        <a:xfrm>
+          <a:off x="0" y="0"/>
+          <a:ext cx="0" cy="0"/>
+          <a:chOff x="0" y="0"/>
+          <a:chExt cx="0" cy="0"/>
+        </a:xfrm>
+      </p:grpSpPr>
+      <p:sp>
+        <p:nvSpPr>
+          <p:cNvPr id="2" name="Title 1">
+            <a:extLst>
+              <a:ext uri="{FF2B5EF4-FFF2-40B4-BE49-F238E27FC236}">
+                <a16:creationId xmlns:a16="http://schemas.microsoft.com/office/drawing/2014/main" id="{C03981A4-36E2-4C1F-89BB-6500D5027584}"/>
+              </a:ext>
+            </a:extLst>
+          </p:cNvPr>
+          <p:cNvSpPr>
+            <a:spLocks noGrp="1"/>
+          </p:cNvSpPr>
+          <p:nvPr>
+            <p:ph type="title"/>
+          </p:nvPr>
+        </p:nvSpPr>
+        <p:spPr/>
+        <p:txBody>
+          <a:bodyPr/>
+          <a:lstStyle/>
+          <a:p>
+            <a:r>
+              <a:rPr lang="en-US" dirty="0"/>
+              <a:t>Section 1 review</a:t>
+            </a:r>
+          </a:p>
+        </p:txBody>
+      </p:sp>
+      <p:sp>
+        <p:nvSpPr>
+          <p:cNvPr id="3" name="Content Placeholder 2">
+            <a:extLst>
+              <a:ext uri="{FF2B5EF4-FFF2-40B4-BE49-F238E27FC236}">
+                <a16:creationId xmlns:a16="http://schemas.microsoft.com/office/drawing/2014/main" id="{4BCAB913-D7A5-4C01-8319-23DBBBEDC674}"/>
+              </a:ext>
+            </a:extLst>
+          </p:cNvPr>
+          <p:cNvSpPr>
+            <a:spLocks noGrp="1"/>
+          </p:cNvSpPr>
+          <p:nvPr>
+            <p:ph idx="1"/>
+          </p:nvPr>
+        </p:nvSpPr>
+        <p:spPr/>
+        <p:txBody>
+          <a:bodyPr/>
+          <a:lstStyle/>
+          <a:p>
+            <a:r>
+              <a:rPr lang="en-US" dirty="0"/>
+              <a:t>Title Block Mastery</a:t>
+            </a:r>
+          </a:p>
+          <a:p>
+            <a:pPr lvl="1"/>
+            <a:r>
+              <a:rPr lang="en-US" dirty="0"/>
+              <a:t>Drawing #1</a:t>
+            </a:r>
+          </a:p>
+          <a:p>
+            <a:r>
+              <a:rPr lang="en-US" dirty="0"/>
+              <a:t>Title Block Test</a:t>
+            </a:r>
+          </a:p>
+          <a:p>
+            <a:pPr lvl="1"/>
+            <a:r>
+              <a:rPr lang="en-US" dirty="0"/>
+              <a:t>Drawing #2</a:t>
+            </a:r>
+          </a:p>
+          <a:p>
+            <a:endParaRPr lang="en-US" dirty="0"/>
+          </a:p>
+        </p:txBody>
+      </p:sp>
+      <p:sp>
+        <p:nvSpPr>
+          <p:cNvPr id="4" name="Footer Placeholder 3">
+            <a:extLst>
+              <a:ext uri="{FF2B5EF4-FFF2-40B4-BE49-F238E27FC236}">
+                <a16:creationId xmlns:a16="http://schemas.microsoft.com/office/drawing/2014/main" id="{08F8D373-640E-4D53-8AAC-5A5560E913DC}"/>
+              </a:ext>
+            </a:extLst>
+          </p:cNvPr>
+          <p:cNvSpPr>
+            <a:spLocks noGrp="1"/>
+          </p:cNvSpPr>
+          <p:nvPr>
+            <p:ph type="ftr" sz="quarter" idx="11"/>
+          </p:nvPr>
+        </p:nvSpPr>
+        <p:spPr/>
+        <p:txBody>
+          <a:bodyPr/>
+          <a:lstStyle/>
+          <a:p>
+            <a:r>
+              <a:rPr lang="en-US"/>
+              <a:t>Add a footer</a:t>
+            </a:r>
+            <a:endParaRPr lang="en-US" dirty="0"/>
+          </a:p>
+        </p:txBody>
+      </p:sp>
+    </p:spTree>
+    <p:extLst>
+      <p:ext uri="{BB962C8B-B14F-4D97-AF65-F5344CB8AC3E}">
+        <p14:creationId xmlns:p14="http://schemas.microsoft.com/office/powerpoint/2010/main" val="2145711180"/>
+      </p:ext>
+    </p:extLst>
+  </p:cSld>
+  <p:clrMapOvr>
+    <a:masterClrMapping/>
+  </p:clrMapOvr>
+  <mc:AlternateContent xmlns:mc="http://schemas.openxmlformats.org/markup-compatibility/2006" xmlns:p14="http://schemas.microsoft.com/office/powerpoint/2010/main">
+    <mc:Choice Requires="p14">
+      <p:transition spd="med" p14:dur="700">
+        <p:fade/>
+      </p:transition>
+    </mc:Choice>
+    <mc:Fallback xmlns="">
+      <p:transition spd="med">
+        <p:fade/>
+      </p:transition>
+    </mc:Fallback>
+  </mc:AlternateContent>
+</p:sld>
+</file>
+
+<file path=ppt/slides/slide6.xml><?xml version="1.0" encoding="utf-8"?>
 <p:sld xmlns:a="http://schemas.openxmlformats.org/drawingml/2006/main" xmlns:r="http://schemas.openxmlformats.org/officeDocument/2006/relationships" xmlns:p="http://schemas.openxmlformats.org/presentationml/2006/main">
   <p:cSld>
     <p:spTree>
@@ -4415,7 +4786,7 @@
 </p:sld>
 </file>
 
-<file path=ppt/slides/slide5.xml><?xml version="1.0" encoding="utf-8"?>
+<file path=ppt/slides/slide7.xml><?xml version="1.0" encoding="utf-8"?>
 <p:sld xmlns:a="http://schemas.openxmlformats.org/drawingml/2006/main" xmlns:r="http://schemas.openxmlformats.org/officeDocument/2006/relationships" xmlns:p="http://schemas.openxmlformats.org/presentationml/2006/main">
   <p:cSld>
     <p:spTree>
@@ -4625,7 +4996,7 @@
 </p:sld>
 </file>
 
-<file path=ppt/slides/slide6.xml><?xml version="1.0" encoding="utf-8"?>
+<file path=ppt/slides/slide8.xml><?xml version="1.0" encoding="utf-8"?>
 <p:sld xmlns:a="http://schemas.openxmlformats.org/drawingml/2006/main" xmlns:r="http://schemas.openxmlformats.org/officeDocument/2006/relationships" xmlns:p="http://schemas.openxmlformats.org/presentationml/2006/main">
   <p:cSld>
     <p:spTree>
@@ -4756,7 +5127,7 @@
 </p:sld>
 </file>
 
-<file path=ppt/slides/slide7.xml><?xml version="1.0" encoding="utf-8"?>
+<file path=ppt/slides/slide9.xml><?xml version="1.0" encoding="utf-8"?>
 <p:sld xmlns:a="http://schemas.openxmlformats.org/drawingml/2006/main" xmlns:r="http://schemas.openxmlformats.org/officeDocument/2006/relationships" xmlns:p="http://schemas.openxmlformats.org/presentationml/2006/main">
   <p:cSld>
     <p:spTree>
@@ -4893,155 +5264,6 @@
     <p:extLst>
       <p:ext uri="{BB962C8B-B14F-4D97-AF65-F5344CB8AC3E}">
         <p14:creationId xmlns:p14="http://schemas.microsoft.com/office/powerpoint/2010/main" val="1226657987"/>
-      </p:ext>
-    </p:extLst>
-  </p:cSld>
-  <p:clrMapOvr>
-    <a:masterClrMapping/>
-  </p:clrMapOvr>
-  <mc:AlternateContent xmlns:mc="http://schemas.openxmlformats.org/markup-compatibility/2006" xmlns:p14="http://schemas.microsoft.com/office/powerpoint/2010/main">
-    <mc:Choice Requires="p14">
-      <p:transition spd="med" p14:dur="700">
-        <p:fade/>
-      </p:transition>
-    </mc:Choice>
-    <mc:Fallback xmlns="">
-      <p:transition spd="med">
-        <p:fade/>
-      </p:transition>
-    </mc:Fallback>
-  </mc:AlternateContent>
-</p:sld>
-</file>
-
-<file path=ppt/slides/slide8.xml><?xml version="1.0" encoding="utf-8"?>
-<p:sld xmlns:a="http://schemas.openxmlformats.org/drawingml/2006/main" xmlns:r="http://schemas.openxmlformats.org/officeDocument/2006/relationships" xmlns:p="http://schemas.openxmlformats.org/presentationml/2006/main">
-  <p:cSld>
-    <p:spTree>
-      <p:nvGrpSpPr>
-        <p:cNvPr id="1" name=""/>
-        <p:cNvGrpSpPr/>
-        <p:nvPr/>
-      </p:nvGrpSpPr>
-      <p:grpSpPr>
-        <a:xfrm>
-          <a:off x="0" y="0"/>
-          <a:ext cx="0" cy="0"/>
-          <a:chOff x="0" y="0"/>
-          <a:chExt cx="0" cy="0"/>
-        </a:xfrm>
-      </p:grpSpPr>
-      <p:sp>
-        <p:nvSpPr>
-          <p:cNvPr id="2" name="Title 1">
-            <a:extLst>
-              <a:ext uri="{FF2B5EF4-FFF2-40B4-BE49-F238E27FC236}">
-                <a16:creationId xmlns:a16="http://schemas.microsoft.com/office/drawing/2014/main" id="{A4C971C0-D93B-45D8-BA8B-A9D98C51B706}"/>
-              </a:ext>
-            </a:extLst>
-          </p:cNvPr>
-          <p:cNvSpPr>
-            <a:spLocks noGrp="1"/>
-          </p:cNvSpPr>
-          <p:nvPr>
-            <p:ph type="title"/>
-          </p:nvPr>
-        </p:nvSpPr>
-        <p:spPr/>
-        <p:txBody>
-          <a:bodyPr/>
-          <a:lstStyle/>
-          <a:p>
-            <a:r>
-              <a:rPr lang="en-US" dirty="0"/>
-              <a:t>Drawn to scale?</a:t>
-            </a:r>
-          </a:p>
-        </p:txBody>
-      </p:sp>
-      <p:sp>
-        <p:nvSpPr>
-          <p:cNvPr id="4" name="Footer Placeholder 3">
-            <a:extLst>
-              <a:ext uri="{FF2B5EF4-FFF2-40B4-BE49-F238E27FC236}">
-                <a16:creationId xmlns:a16="http://schemas.microsoft.com/office/drawing/2014/main" id="{F7804C1A-E949-45EB-B41C-0FBCA44D8F99}"/>
-              </a:ext>
-            </a:extLst>
-          </p:cNvPr>
-          <p:cNvSpPr>
-            <a:spLocks noGrp="1"/>
-          </p:cNvSpPr>
-          <p:nvPr>
-            <p:ph type="ftr" sz="quarter" idx="11"/>
-          </p:nvPr>
-        </p:nvSpPr>
-        <p:spPr/>
-        <p:txBody>
-          <a:bodyPr/>
-          <a:lstStyle/>
-          <a:p>
-            <a:r>
-              <a:rPr lang="en-US"/>
-              <a:t>Add a footer</a:t>
-            </a:r>
-            <a:endParaRPr lang="en-US" dirty="0"/>
-          </a:p>
-        </p:txBody>
-      </p:sp>
-      <p:sp>
-        <p:nvSpPr>
-          <p:cNvPr id="7" name="Content Placeholder 6">
-            <a:extLst>
-              <a:ext uri="{FF2B5EF4-FFF2-40B4-BE49-F238E27FC236}">
-                <a16:creationId xmlns:a16="http://schemas.microsoft.com/office/drawing/2014/main" id="{39B63222-2E6C-4372-B810-03E263DE588E}"/>
-              </a:ext>
-            </a:extLst>
-          </p:cNvPr>
-          <p:cNvSpPr>
-            <a:spLocks noGrp="1"/>
-          </p:cNvSpPr>
-          <p:nvPr>
-            <p:ph idx="1"/>
-          </p:nvPr>
-        </p:nvSpPr>
-        <p:spPr/>
-        <p:txBody>
-          <a:bodyPr>
-            <a:normAutofit/>
-          </a:bodyPr>
-          <a:lstStyle/>
-          <a:p>
-            <a:pPr marL="457200" indent="-457200">
-              <a:spcBef>
-                <a:spcPct val="50000"/>
-              </a:spcBef>
-              <a:buFont typeface="Arial" pitchFamily="34" charset="0"/>
-              <a:buChar char="•"/>
-            </a:pPr>
-            <a:r>
-              <a:rPr lang="en-US" sz="4000" dirty="0"/>
-              <a:t>Floor plans for residential structures are usually drawn at ¼” = 1’.</a:t>
-            </a:r>
-          </a:p>
-          <a:p>
-            <a:pPr marL="457200" indent="-457200">
-              <a:spcBef>
-                <a:spcPct val="50000"/>
-              </a:spcBef>
-              <a:buFont typeface="Arial" pitchFamily="34" charset="0"/>
-              <a:buChar char="•"/>
-            </a:pPr>
-            <a:r>
-              <a:rPr lang="en-US" sz="4000" dirty="0"/>
-              <a:t>Commercial buildings may be drawn at 1/8” = 1’ if they are too large to fit on the desired sheet size at ¼” = 1’.</a:t>
-            </a:r>
-          </a:p>
-        </p:txBody>
-      </p:sp>
-    </p:spTree>
-    <p:extLst>
-      <p:ext uri="{BB962C8B-B14F-4D97-AF65-F5344CB8AC3E}">
-        <p14:creationId xmlns:p14="http://schemas.microsoft.com/office/powerpoint/2010/main" val="3350062661"/>
       </p:ext>
     </p:extLst>
   </p:cSld>

</xml_diff>